<commit_message>
added neem and tulsi
</commit_message>
<xml_diff>
--- a/Demo Day Presentation.pptx
+++ b/Demo Day Presentation.pptx
@@ -5,15 +5,16 @@
     <p:sldMasterId id="2147483648" r:id="rId1"/>
   </p:sldMasterIdLst>
   <p:notesMasterIdLst>
-    <p:notesMasterId r:id="rId8"/>
+    <p:notesMasterId r:id="rId9"/>
   </p:notesMasterIdLst>
   <p:sldIdLst>
     <p:sldId id="256" r:id="rId2"/>
     <p:sldId id="2147468417" r:id="rId3"/>
     <p:sldId id="2147468418" r:id="rId4"/>
-    <p:sldId id="2147468419" r:id="rId5"/>
-    <p:sldId id="2147468416" r:id="rId6"/>
-    <p:sldId id="2147468414" r:id="rId7"/>
+    <p:sldId id="2147468420" r:id="rId5"/>
+    <p:sldId id="2147468419" r:id="rId6"/>
+    <p:sldId id="2147468416" r:id="rId7"/>
+    <p:sldId id="2147468414" r:id="rId8"/>
   </p:sldIdLst>
   <p:sldSz cx="12192000" cy="6858000"/>
   <p:notesSz cx="12192000" cy="6858000"/>
@@ -797,7 +798,7 @@
           <a:p>
             <a:fld id="{DBA572B7-9C81-4EE9-8BD8-11A240F7AF89}" type="datetimeFigureOut">
               <a:rPr lang="en-US" smtClean="0"/>
-              <a:t>2022-09-28</a:t>
+              <a:t>2022-09-29</a:t>
             </a:fld>
             <a:endParaRPr lang="en-US"/>
           </a:p>
@@ -1402,7 +1403,7 @@
     </p:spTree>
     <p:extLst>
       <p:ext uri="{BB962C8B-B14F-4D97-AF65-F5344CB8AC3E}">
-        <p14:creationId xmlns:p14="http://schemas.microsoft.com/office/powerpoint/2010/main" val="3602434318"/>
+        <p14:creationId xmlns:p14="http://schemas.microsoft.com/office/powerpoint/2010/main" val="761449750"/>
       </p:ext>
     </p:extLst>
   </p:cSld>
@@ -1456,7 +1457,10 @@
           <a:bodyPr/>
           <a:lstStyle/>
           <a:p>
-            <a:endParaRPr lang="en-US" dirty="0"/>
+            <a:r>
+              <a:rPr lang="en-US" dirty="0"/>
+              <a:t>3 minutes total time</a:t>
+            </a:r>
           </a:p>
         </p:txBody>
       </p:sp>
@@ -1486,7 +1490,175 @@
     </p:spTree>
     <p:extLst>
       <p:ext uri="{BB962C8B-B14F-4D97-AF65-F5344CB8AC3E}">
+        <p14:creationId xmlns:p14="http://schemas.microsoft.com/office/powerpoint/2010/main" val="3602434318"/>
+      </p:ext>
+    </p:extLst>
+  </p:cSld>
+  <p:clrMapOvr>
+    <a:masterClrMapping/>
+  </p:clrMapOvr>
+</p:notes>
+</file>
+
+<file path=ppt/notesSlides/notesSlide6.xml><?xml version="1.0" encoding="utf-8"?>
+<p:notes xmlns:a="http://schemas.openxmlformats.org/drawingml/2006/main" xmlns:r="http://schemas.openxmlformats.org/officeDocument/2006/relationships" xmlns:p="http://schemas.openxmlformats.org/presentationml/2006/main">
+  <p:cSld>
+    <p:spTree>
+      <p:nvGrpSpPr>
+        <p:cNvPr id="1" name=""/>
+        <p:cNvGrpSpPr/>
+        <p:nvPr/>
+      </p:nvGrpSpPr>
+      <p:grpSpPr>
+        <a:xfrm>
+          <a:off x="0" y="0"/>
+          <a:ext cx="0" cy="0"/>
+          <a:chOff x="0" y="0"/>
+          <a:chExt cx="0" cy="0"/>
+        </a:xfrm>
+      </p:grpSpPr>
+      <p:sp>
+        <p:nvSpPr>
+          <p:cNvPr id="2" name="Slide Image Placeholder 1"/>
+          <p:cNvSpPr>
+            <a:spLocks noGrp="1" noRot="1" noChangeAspect="1"/>
+          </p:cNvSpPr>
+          <p:nvPr>
+            <p:ph type="sldImg"/>
+          </p:nvPr>
+        </p:nvSpPr>
+        <p:spPr/>
+      </p:sp>
+      <p:sp>
+        <p:nvSpPr>
+          <p:cNvPr id="3" name="Notes Placeholder 2"/>
+          <p:cNvSpPr>
+            <a:spLocks noGrp="1"/>
+          </p:cNvSpPr>
+          <p:nvPr>
+            <p:ph type="body" idx="1"/>
+          </p:nvPr>
+        </p:nvSpPr>
+        <p:spPr/>
+        <p:txBody>
+          <a:bodyPr/>
+          <a:lstStyle/>
+          <a:p>
+            <a:endParaRPr lang="en-US" dirty="0"/>
+          </a:p>
+        </p:txBody>
+      </p:sp>
+      <p:sp>
+        <p:nvSpPr>
+          <p:cNvPr id="4" name="Slide Number Placeholder 3"/>
+          <p:cNvSpPr>
+            <a:spLocks noGrp="1"/>
+          </p:cNvSpPr>
+          <p:nvPr>
+            <p:ph type="sldNum" sz="quarter" idx="5"/>
+          </p:nvPr>
+        </p:nvSpPr>
+        <p:spPr/>
+        <p:txBody>
+          <a:bodyPr/>
+          <a:lstStyle/>
+          <a:p>
+            <a:fld id="{A5325577-72FF-4C06-B951-B1479914B2C6}" type="slidenum">
+              <a:rPr lang="en-US" smtClean="0"/>
+              <a:t>6</a:t>
+            </a:fld>
+            <a:endParaRPr lang="en-US"/>
+          </a:p>
+        </p:txBody>
+      </p:sp>
+    </p:spTree>
+    <p:extLst>
+      <p:ext uri="{BB962C8B-B14F-4D97-AF65-F5344CB8AC3E}">
         <p14:creationId xmlns:p14="http://schemas.microsoft.com/office/powerpoint/2010/main" val="418845153"/>
+      </p:ext>
+    </p:extLst>
+  </p:cSld>
+  <p:clrMapOvr>
+    <a:masterClrMapping/>
+  </p:clrMapOvr>
+</p:notes>
+</file>
+
+<file path=ppt/notesSlides/notesSlide7.xml><?xml version="1.0" encoding="utf-8"?>
+<p:notes xmlns:a="http://schemas.openxmlformats.org/drawingml/2006/main" xmlns:r="http://schemas.openxmlformats.org/officeDocument/2006/relationships" xmlns:p="http://schemas.openxmlformats.org/presentationml/2006/main">
+  <p:cSld>
+    <p:spTree>
+      <p:nvGrpSpPr>
+        <p:cNvPr id="1" name=""/>
+        <p:cNvGrpSpPr/>
+        <p:nvPr/>
+      </p:nvGrpSpPr>
+      <p:grpSpPr>
+        <a:xfrm>
+          <a:off x="0" y="0"/>
+          <a:ext cx="0" cy="0"/>
+          <a:chOff x="0" y="0"/>
+          <a:chExt cx="0" cy="0"/>
+        </a:xfrm>
+      </p:grpSpPr>
+      <p:sp>
+        <p:nvSpPr>
+          <p:cNvPr id="2" name="Slide Image Placeholder 1"/>
+          <p:cNvSpPr>
+            <a:spLocks noGrp="1" noRot="1" noChangeAspect="1"/>
+          </p:cNvSpPr>
+          <p:nvPr>
+            <p:ph type="sldImg"/>
+          </p:nvPr>
+        </p:nvSpPr>
+        <p:spPr/>
+      </p:sp>
+      <p:sp>
+        <p:nvSpPr>
+          <p:cNvPr id="3" name="Notes Placeholder 2"/>
+          <p:cNvSpPr>
+            <a:spLocks noGrp="1"/>
+          </p:cNvSpPr>
+          <p:nvPr>
+            <p:ph type="body" idx="1"/>
+          </p:nvPr>
+        </p:nvSpPr>
+        <p:spPr/>
+        <p:txBody>
+          <a:bodyPr/>
+          <a:lstStyle/>
+          <a:p>
+            <a:endParaRPr lang="en-US" dirty="0"/>
+          </a:p>
+        </p:txBody>
+      </p:sp>
+      <p:sp>
+        <p:nvSpPr>
+          <p:cNvPr id="4" name="Slide Number Placeholder 3"/>
+          <p:cNvSpPr>
+            <a:spLocks noGrp="1"/>
+          </p:cNvSpPr>
+          <p:nvPr>
+            <p:ph type="sldNum" sz="quarter" idx="5"/>
+          </p:nvPr>
+        </p:nvSpPr>
+        <p:spPr/>
+        <p:txBody>
+          <a:bodyPr/>
+          <a:lstStyle/>
+          <a:p>
+            <a:fld id="{A5325577-72FF-4C06-B951-B1479914B2C6}" type="slidenum">
+              <a:rPr lang="en-US" smtClean="0"/>
+              <a:t>7</a:t>
+            </a:fld>
+            <a:endParaRPr lang="en-US"/>
+          </a:p>
+        </p:txBody>
+      </p:sp>
+    </p:spTree>
+    <p:extLst>
+      <p:ext uri="{BB962C8B-B14F-4D97-AF65-F5344CB8AC3E}">
+        <p14:creationId xmlns:p14="http://schemas.microsoft.com/office/powerpoint/2010/main" val="3688659443"/>
       </p:ext>
     </p:extLst>
   </p:cSld>
@@ -1635,7 +1807,7 @@
           <a:p>
             <a:fld id="{1D8BD707-D9CF-40AE-B4C6-C98DA3205C09}" type="datetimeFigureOut">
               <a:rPr lang="en-US"/>
-              <a:t>2022-09-28</a:t>
+              <a:t>2022-09-29</a:t>
             </a:fld>
             <a:endParaRPr lang="en-US"/>
           </a:p>
@@ -1812,7 +1984,7 @@
           <a:p>
             <a:fld id="{1D8BD707-D9CF-40AE-B4C6-C98DA3205C09}" type="datetimeFigureOut">
               <a:rPr lang="en-US"/>
-              <a:t>2022-09-28</a:t>
+              <a:t>2022-09-29</a:t>
             </a:fld>
             <a:endParaRPr lang="en-US"/>
           </a:p>
@@ -2032,7 +2204,7 @@
           <a:p>
             <a:fld id="{1D8BD707-D9CF-40AE-B4C6-C98DA3205C09}" type="datetimeFigureOut">
               <a:rPr lang="en-US"/>
-              <a:t>2022-09-28</a:t>
+              <a:t>2022-09-29</a:t>
             </a:fld>
             <a:endParaRPr lang="en-US"/>
           </a:p>
@@ -3414,7 +3586,7 @@
           <a:p>
             <a:fld id="{1D8BD707-D9CF-40AE-B4C6-C98DA3205C09}" type="datetimeFigureOut">
               <a:rPr lang="en-US"/>
-              <a:t>2022-09-28</a:t>
+              <a:t>2022-09-29</a:t>
             </a:fld>
             <a:endParaRPr lang="en-US"/>
           </a:p>
@@ -3533,7 +3705,7 @@
           <a:p>
             <a:fld id="{1D8BD707-D9CF-40AE-B4C6-C98DA3205C09}" type="datetimeFigureOut">
               <a:rPr lang="en-US"/>
-              <a:t>2022-09-28</a:t>
+              <a:t>2022-09-29</a:t>
             </a:fld>
             <a:endParaRPr lang="en-US"/>
           </a:p>
@@ -3572,6 +3744,147 @@
         </p:txBody>
       </p:sp>
     </p:spTree>
+  </p:cSld>
+  <p:clrMapOvr>
+    <a:masterClrMapping/>
+  </p:clrMapOvr>
+</p:sldLayout>
+</file>
+
+<file path=ppt/slideLayouts/slideLayout6.xml><?xml version="1.0" encoding="utf-8"?>
+<p:sldLayout xmlns:a="http://schemas.openxmlformats.org/drawingml/2006/main" xmlns:r="http://schemas.openxmlformats.org/officeDocument/2006/relationships" xmlns:p="http://schemas.openxmlformats.org/presentationml/2006/main" preserve="1" userDrawn="1">
+  <p:cSld name="Custom Layout">
+    <p:spTree>
+      <p:nvGrpSpPr>
+        <p:cNvPr id="1" name=""/>
+        <p:cNvGrpSpPr/>
+        <p:nvPr/>
+      </p:nvGrpSpPr>
+      <p:grpSpPr>
+        <a:xfrm>
+          <a:off x="0" y="0"/>
+          <a:ext cx="0" cy="0"/>
+          <a:chOff x="0" y="0"/>
+          <a:chExt cx="0" cy="0"/>
+        </a:xfrm>
+      </p:grpSpPr>
+      <p:sp>
+        <p:nvSpPr>
+          <p:cNvPr id="2" name="Title 1">
+            <a:extLst>
+              <a:ext uri="{FF2B5EF4-FFF2-40B4-BE49-F238E27FC236}">
+                <a16:creationId xmlns:a16="http://schemas.microsoft.com/office/drawing/2014/main" id="{DF9A22BB-3DC4-ACD3-B691-49FD627CF641}"/>
+              </a:ext>
+            </a:extLst>
+          </p:cNvPr>
+          <p:cNvSpPr>
+            <a:spLocks noGrp="1"/>
+          </p:cNvSpPr>
+          <p:nvPr>
+            <p:ph type="title"/>
+          </p:nvPr>
+        </p:nvSpPr>
+        <p:spPr/>
+        <p:txBody>
+          <a:bodyPr/>
+          <a:lstStyle/>
+          <a:p>
+            <a:r>
+              <a:rPr lang="en-US"/>
+              <a:t>Click to edit Master title style</a:t>
+            </a:r>
+          </a:p>
+        </p:txBody>
+      </p:sp>
+      <p:sp>
+        <p:nvSpPr>
+          <p:cNvPr id="3" name="Footer Placeholder 2">
+            <a:extLst>
+              <a:ext uri="{FF2B5EF4-FFF2-40B4-BE49-F238E27FC236}">
+                <a16:creationId xmlns:a16="http://schemas.microsoft.com/office/drawing/2014/main" id="{B5BE6C05-7F62-6AB8-42D2-9FE5F04ABE01}"/>
+              </a:ext>
+            </a:extLst>
+          </p:cNvPr>
+          <p:cNvSpPr>
+            <a:spLocks noGrp="1"/>
+          </p:cNvSpPr>
+          <p:nvPr>
+            <p:ph type="ftr" sz="quarter" idx="10"/>
+          </p:nvPr>
+        </p:nvSpPr>
+        <p:spPr/>
+        <p:txBody>
+          <a:bodyPr/>
+          <a:lstStyle/>
+          <a:p>
+            <a:endParaRPr lang="en-US"/>
+          </a:p>
+        </p:txBody>
+      </p:sp>
+      <p:sp>
+        <p:nvSpPr>
+          <p:cNvPr id="4" name="Date Placeholder 3">
+            <a:extLst>
+              <a:ext uri="{FF2B5EF4-FFF2-40B4-BE49-F238E27FC236}">
+                <a16:creationId xmlns:a16="http://schemas.microsoft.com/office/drawing/2014/main" id="{59D105EB-5E11-4A54-9DF0-DFF6974BA497}"/>
+              </a:ext>
+            </a:extLst>
+          </p:cNvPr>
+          <p:cNvSpPr>
+            <a:spLocks noGrp="1"/>
+          </p:cNvSpPr>
+          <p:nvPr>
+            <p:ph type="dt" sz="half" idx="11"/>
+          </p:nvPr>
+        </p:nvSpPr>
+        <p:spPr/>
+        <p:txBody>
+          <a:bodyPr/>
+          <a:lstStyle/>
+          <a:p>
+            <a:fld id="{1D8BD707-D9CF-40AE-B4C6-C98DA3205C09}" type="datetimeFigureOut">
+              <a:rPr lang="en-US" smtClean="0"/>
+              <a:t>2022-09-29</a:t>
+            </a:fld>
+            <a:endParaRPr lang="en-US"/>
+          </a:p>
+        </p:txBody>
+      </p:sp>
+      <p:sp>
+        <p:nvSpPr>
+          <p:cNvPr id="5" name="Slide Number Placeholder 4">
+            <a:extLst>
+              <a:ext uri="{FF2B5EF4-FFF2-40B4-BE49-F238E27FC236}">
+                <a16:creationId xmlns:a16="http://schemas.microsoft.com/office/drawing/2014/main" id="{ADCE98C0-7C83-CEA3-5A4F-4C0D4D57EDAC}"/>
+              </a:ext>
+            </a:extLst>
+          </p:cNvPr>
+          <p:cNvSpPr>
+            <a:spLocks noGrp="1"/>
+          </p:cNvSpPr>
+          <p:nvPr>
+            <p:ph type="sldNum" sz="quarter" idx="12"/>
+          </p:nvPr>
+        </p:nvSpPr>
+        <p:spPr/>
+        <p:txBody>
+          <a:bodyPr/>
+          <a:lstStyle/>
+          <a:p>
+            <a:fld id="{B6F15528-21DE-4FAA-801E-634DDDAF4B2B}" type="slidenum">
+              <a:rPr lang="en-US" smtClean="0"/>
+              <a:t>‹#›</a:t>
+            </a:fld>
+            <a:endParaRPr lang="en-US"/>
+          </a:p>
+        </p:txBody>
+      </p:sp>
+    </p:spTree>
+    <p:extLst>
+      <p:ext uri="{BB962C8B-B14F-4D97-AF65-F5344CB8AC3E}">
+        <p14:creationId xmlns:p14="http://schemas.microsoft.com/office/powerpoint/2010/main" val="1819258551"/>
+      </p:ext>
+    </p:extLst>
   </p:cSld>
   <p:clrMapOvr>
     <a:masterClrMapping/>
@@ -3800,7 +4113,7 @@
           <a:p>
             <a:fld id="{1D8BD707-D9CF-40AE-B4C6-C98DA3205C09}" type="datetimeFigureOut">
               <a:rPr lang="en-US"/>
-              <a:t>2022-09-28</a:t>
+              <a:t>2022-09-29</a:t>
             </a:fld>
             <a:endParaRPr lang="en-US"/>
           </a:p>
@@ -3857,6 +4170,7 @@
     <p:sldLayoutId id="2147483663" r:id="rId3"/>
     <p:sldLayoutId id="2147483664" r:id="rId4"/>
     <p:sldLayoutId id="2147483665" r:id="rId5"/>
+    <p:sldLayoutId id="2147483666" r:id="rId6"/>
   </p:sldLayoutIdLst>
   <p:txStyles>
     <p:titleStyle>
@@ -4042,7 +4356,7 @@
         </p:nvSpPr>
         <p:spPr>
           <a:xfrm>
-            <a:off x="0" y="28353"/>
+            <a:off x="0" y="0"/>
             <a:ext cx="5762625" cy="6858000"/>
           </a:xfrm>
           <a:custGeom>
@@ -4178,7 +4492,7 @@
         <p:spPr>
           <a:xfrm>
             <a:off x="569912" y="1752600"/>
-            <a:ext cx="3621088" cy="1352934"/>
+            <a:ext cx="4611688" cy="1378583"/>
           </a:xfrm>
           <a:prstGeom prst="rect">
             <a:avLst/>
@@ -4206,47 +4520,7 @@
                 <a:latin typeface="Segoe UI"/>
                 <a:cs typeface="Segoe UI"/>
               </a:rPr>
-              <a:t>Social</a:t>
-            </a:r>
-            <a:r>
-              <a:rPr lang="en-US" sz="2150" spc="110" dirty="0">
-                <a:solidFill>
-                  <a:srgbClr val="FFFFFF"/>
-                </a:solidFill>
-                <a:latin typeface="Segoe UI"/>
-                <a:cs typeface="Segoe UI"/>
-              </a:rPr>
-              <a:t> </a:t>
-            </a:r>
-            <a:r>
-              <a:rPr lang="en-US" sz="2150" dirty="0">
-                <a:solidFill>
-                  <a:srgbClr val="FFFFFF"/>
-                </a:solidFill>
-                <a:latin typeface="Segoe UI"/>
-                <a:cs typeface="Segoe UI"/>
-              </a:rPr>
-              <a:t>Impact</a:t>
-            </a:r>
-            <a:r>
-              <a:rPr lang="en-US" sz="2150" spc="-20" dirty="0">
-                <a:solidFill>
-                  <a:srgbClr val="FFFFFF"/>
-                </a:solidFill>
-                <a:latin typeface="Segoe UI"/>
-                <a:cs typeface="Segoe UI"/>
-              </a:rPr>
-              <a:t> League </a:t>
-            </a:r>
-            <a:r>
-              <a:rPr lang="en-US" sz="2150" dirty="0">
-                <a:solidFill>
-                  <a:srgbClr val="FFFFFF"/>
-                </a:solidFill>
-                <a:latin typeface="Segoe UI"/>
-                <a:cs typeface="Segoe UI"/>
-              </a:rPr>
-              <a:t>Project</a:t>
+              <a:t>Social Impact League Demo Day </a:t>
             </a:r>
             <a:r>
               <a:rPr lang="en-US" sz="2150" spc="130" dirty="0">
@@ -4256,8 +4530,38 @@
                 <a:latin typeface="Segoe UI"/>
                 <a:cs typeface="Segoe UI"/>
               </a:rPr>
-              <a:t> 2022</a:t>
+              <a:t> </a:t>
             </a:r>
+          </a:p>
+          <a:p>
+            <a:pPr marL="12700">
+              <a:lnSpc>
+                <a:spcPct val="100000"/>
+              </a:lnSpc>
+              <a:spcBef>
+                <a:spcPts val="130"/>
+              </a:spcBef>
+            </a:pPr>
+            <a:r>
+              <a:rPr lang="en-US" sz="2150" spc="130" dirty="0">
+                <a:solidFill>
+                  <a:srgbClr val="FFFFFF"/>
+                </a:solidFill>
+                <a:latin typeface="Segoe UI"/>
+                <a:cs typeface="Segoe UI"/>
+              </a:rPr>
+              <a:t>Jul-Sept 2022</a:t>
+            </a:r>
+          </a:p>
+          <a:p>
+            <a:pPr marL="12700">
+              <a:lnSpc>
+                <a:spcPct val="100000"/>
+              </a:lnSpc>
+              <a:spcBef>
+                <a:spcPts val="130"/>
+              </a:spcBef>
+            </a:pPr>
             <a:r>
               <a:rPr lang="en-US" sz="2150" dirty="0">
                 <a:solidFill>
@@ -4266,7 +4570,7 @@
                 <a:latin typeface="Segoe UI"/>
                 <a:cs typeface="Segoe UI"/>
               </a:rPr>
-              <a:t>– Prototype Sprint (Green Tech)</a:t>
+              <a:t>Prototype Sprint (Green Tech)</a:t>
             </a:r>
             <a:endParaRPr lang="en-US" sz="2150" dirty="0">
               <a:latin typeface="Segoe UI"/>
@@ -4304,7 +4608,7 @@
         <p:spPr>
           <a:xfrm>
             <a:off x="569912" y="3200400"/>
-            <a:ext cx="4314190" cy="3440685"/>
+            <a:ext cx="4314190" cy="3097002"/>
           </a:xfrm>
           <a:prstGeom prst="rect">
             <a:avLst/>
@@ -4554,20 +4858,6 @@
               <a:cs typeface="Segoe UI"/>
             </a:endParaRPr>
           </a:p>
-          <a:p>
-            <a:pPr marL="12700">
-              <a:lnSpc>
-                <a:spcPct val="100000"/>
-              </a:lnSpc>
-              <a:spcBef>
-                <a:spcPts val="130"/>
-              </a:spcBef>
-            </a:pPr>
-            <a:endParaRPr lang="en-US" sz="2150" dirty="0">
-              <a:latin typeface="Segoe UI"/>
-              <a:cs typeface="Segoe UI"/>
-            </a:endParaRPr>
-          </a:p>
         </p:txBody>
       </p:sp>
       <p:pic>
@@ -4598,8 +4888,8 @@
         </p:blipFill>
         <p:spPr>
           <a:xfrm>
-            <a:off x="4852204" y="210966"/>
-            <a:ext cx="8610941" cy="6858000"/>
+            <a:off x="4953000" y="533400"/>
+            <a:ext cx="8324678" cy="6630012"/>
           </a:xfrm>
           <a:prstGeom prst="rect">
             <a:avLst/>
@@ -4889,7 +5179,7 @@
         </p:nvSpPr>
         <p:spPr>
           <a:xfrm>
-            <a:off x="1852519" y="1955097"/>
+            <a:off x="1852519" y="2183697"/>
             <a:ext cx="9723029" cy="3304110"/>
           </a:xfrm>
           <a:prstGeom prst="rect">
@@ -5041,7 +5331,7 @@
         </p:blipFill>
         <p:spPr>
           <a:xfrm>
-            <a:off x="771197" y="1681087"/>
+            <a:off x="771197" y="1909687"/>
             <a:ext cx="914400" cy="914400"/>
           </a:xfrm>
           <a:prstGeom prst="rect">
@@ -5080,7 +5370,7 @@
         </p:blipFill>
         <p:spPr>
           <a:xfrm>
-            <a:off x="771197" y="3037454"/>
+            <a:off x="771197" y="3266054"/>
             <a:ext cx="914400" cy="914400"/>
           </a:xfrm>
           <a:prstGeom prst="rect">
@@ -5119,7 +5409,7 @@
         </p:blipFill>
         <p:spPr>
           <a:xfrm>
-            <a:off x="771197" y="4572000"/>
+            <a:off x="771197" y="4724400"/>
             <a:ext cx="914400" cy="914400"/>
           </a:xfrm>
           <a:prstGeom prst="rect">
@@ -5158,7 +5448,7 @@
         </p:blipFill>
         <p:spPr>
           <a:xfrm>
-            <a:off x="4628346" y="294841"/>
+            <a:off x="4648200" y="228600"/>
             <a:ext cx="914400" cy="914400"/>
           </a:xfrm>
           <a:prstGeom prst="rect">
@@ -5223,7 +5513,7 @@
         </p:nvSpPr>
         <p:spPr>
           <a:xfrm>
-            <a:off x="5318209" y="404499"/>
+            <a:off x="5567680" y="404499"/>
             <a:ext cx="6548120" cy="567463"/>
           </a:xfrm>
           <a:prstGeom prst="rect">
@@ -5454,7 +5744,7 @@
         </p:nvSpPr>
         <p:spPr>
           <a:xfrm>
-            <a:off x="2209801" y="1487079"/>
+            <a:off x="2157411" y="1371600"/>
             <a:ext cx="9220200" cy="4919937"/>
           </a:xfrm>
           <a:prstGeom prst="rect">
@@ -5673,7 +5963,7 @@
         </p:blipFill>
         <p:spPr>
           <a:xfrm>
-            <a:off x="1042990" y="1571765"/>
+            <a:off x="1040605" y="1456286"/>
             <a:ext cx="914400" cy="914400"/>
           </a:xfrm>
           <a:prstGeom prst="rect">
@@ -5712,7 +6002,7 @@
         </p:blipFill>
         <p:spPr>
           <a:xfrm>
-            <a:off x="1063701" y="4114800"/>
+            <a:off x="1040605" y="3962400"/>
             <a:ext cx="914400" cy="914400"/>
           </a:xfrm>
           <a:prstGeom prst="rect">
@@ -5751,7 +6041,7 @@
         </p:blipFill>
         <p:spPr>
           <a:xfrm>
-            <a:off x="1042990" y="2743200"/>
+            <a:off x="1040605" y="2627721"/>
             <a:ext cx="914400" cy="914400"/>
           </a:xfrm>
           <a:prstGeom prst="rect">
@@ -5790,7 +6080,7 @@
         </p:blipFill>
         <p:spPr>
           <a:xfrm>
-            <a:off x="1143000" y="5395389"/>
+            <a:off x="1040605" y="5279910"/>
             <a:ext cx="914400" cy="914400"/>
           </a:xfrm>
           <a:prstGeom prst="rect">
@@ -5829,7 +6119,7 @@
         </p:blipFill>
         <p:spPr>
           <a:xfrm>
-            <a:off x="4267200" y="264962"/>
+            <a:off x="4572000" y="228600"/>
             <a:ext cx="914400" cy="914400"/>
           </a:xfrm>
           <a:prstGeom prst="rect">
@@ -5949,6 +6239,657 @@
         </p:blipFill>
         <p:spPr>
           <a:xfrm>
+            <a:off x="4907021" y="2322329"/>
+            <a:ext cx="1179920" cy="1664693"/>
+          </a:xfrm>
+          <a:prstGeom prst="rect">
+            <a:avLst/>
+          </a:prstGeom>
+        </p:spPr>
+      </p:pic>
+      <p:pic>
+        <p:nvPicPr>
+          <p:cNvPr id="13" name="Graphic 12">
+            <a:extLst>
+              <a:ext uri="{FF2B5EF4-FFF2-40B4-BE49-F238E27FC236}">
+                <a16:creationId xmlns:a16="http://schemas.microsoft.com/office/drawing/2014/main" id="{FF334520-D573-6D51-114B-8FC7C4801F5A}"/>
+              </a:ext>
+            </a:extLst>
+          </p:cNvPr>
+          <p:cNvPicPr>
+            <a:picLocks noChangeAspect="1"/>
+          </p:cNvPicPr>
+          <p:nvPr/>
+        </p:nvPicPr>
+        <p:blipFill>
+          <a:blip r:embed="rId7" cstate="print">
+            <a:extLst>
+              <a:ext uri="{28A0092B-C50C-407E-A947-70E740481C1C}">
+                <a14:useLocalDpi xmlns:a14="http://schemas.microsoft.com/office/drawing/2010/main" val="0"/>
+              </a:ext>
+              <a:ext uri="{96DAC541-7B7A-43D3-8B79-37D633B846F1}">
+                <asvg:svgBlip xmlns:asvg="http://schemas.microsoft.com/office/drawing/2016/SVG/main" r:embed="rId8"/>
+              </a:ext>
+            </a:extLst>
+          </a:blip>
+          <a:stretch>
+            <a:fillRect/>
+          </a:stretch>
+        </p:blipFill>
+        <p:spPr>
+          <a:xfrm>
+            <a:off x="6226385" y="2400268"/>
+            <a:ext cx="1180147" cy="1664692"/>
+          </a:xfrm>
+          <a:prstGeom prst="rect">
+            <a:avLst/>
+          </a:prstGeom>
+        </p:spPr>
+      </p:pic>
+      <p:pic>
+        <p:nvPicPr>
+          <p:cNvPr id="17" name="Graphic 16">
+            <a:extLst>
+              <a:ext uri="{FF2B5EF4-FFF2-40B4-BE49-F238E27FC236}">
+                <a16:creationId xmlns:a16="http://schemas.microsoft.com/office/drawing/2014/main" id="{4889056D-3870-ABB9-709D-C6999AB56231}"/>
+              </a:ext>
+            </a:extLst>
+          </p:cNvPr>
+          <p:cNvPicPr>
+            <a:picLocks noChangeAspect="1"/>
+          </p:cNvPicPr>
+          <p:nvPr/>
+        </p:nvPicPr>
+        <p:blipFill>
+          <a:blip r:embed="rId9">
+            <a:extLst>
+              <a:ext uri="{28A0092B-C50C-407E-A947-70E740481C1C}">
+                <a14:useLocalDpi xmlns:a14="http://schemas.microsoft.com/office/drawing/2010/main" val="0"/>
+              </a:ext>
+              <a:ext uri="{96DAC541-7B7A-43D3-8B79-37D633B846F1}">
+                <asvg:svgBlip xmlns:asvg="http://schemas.microsoft.com/office/drawing/2016/SVG/main" r:embed="rId10"/>
+              </a:ext>
+            </a:extLst>
+          </a:blip>
+          <a:stretch>
+            <a:fillRect/>
+          </a:stretch>
+        </p:blipFill>
+        <p:spPr>
+          <a:xfrm>
+            <a:off x="3200400" y="2443752"/>
+            <a:ext cx="1577725" cy="1577725"/>
+          </a:xfrm>
+          <a:prstGeom prst="rect">
+            <a:avLst/>
+          </a:prstGeom>
+        </p:spPr>
+      </p:pic>
+      <p:pic>
+        <p:nvPicPr>
+          <p:cNvPr id="19" name="Graphic 18">
+            <a:extLst>
+              <a:ext uri="{FF2B5EF4-FFF2-40B4-BE49-F238E27FC236}">
+                <a16:creationId xmlns:a16="http://schemas.microsoft.com/office/drawing/2014/main" id="{EEA5F37F-D15E-5EAA-324D-1D376A21BF0B}"/>
+              </a:ext>
+            </a:extLst>
+          </p:cNvPr>
+          <p:cNvPicPr>
+            <a:picLocks noChangeAspect="1"/>
+          </p:cNvPicPr>
+          <p:nvPr/>
+        </p:nvPicPr>
+        <p:blipFill>
+          <a:blip r:embed="rId11" cstate="print">
+            <a:extLst>
+              <a:ext uri="{28A0092B-C50C-407E-A947-70E740481C1C}">
+                <a14:useLocalDpi xmlns:a14="http://schemas.microsoft.com/office/drawing/2010/main" val="0"/>
+              </a:ext>
+              <a:ext uri="{96DAC541-7B7A-43D3-8B79-37D633B846F1}">
+                <asvg:svgBlip xmlns:asvg="http://schemas.microsoft.com/office/drawing/2016/SVG/main" r:embed="rId12"/>
+              </a:ext>
+            </a:extLst>
+          </a:blip>
+          <a:stretch>
+            <a:fillRect/>
+          </a:stretch>
+        </p:blipFill>
+        <p:spPr>
+          <a:xfrm>
+            <a:off x="4713457" y="5004577"/>
+            <a:ext cx="1548623" cy="1548623"/>
+          </a:xfrm>
+          <a:prstGeom prst="rect">
+            <a:avLst/>
+          </a:prstGeom>
+        </p:spPr>
+      </p:pic>
+      <p:pic>
+        <p:nvPicPr>
+          <p:cNvPr id="21" name="Picture 20">
+            <a:extLst>
+              <a:ext uri="{FF2B5EF4-FFF2-40B4-BE49-F238E27FC236}">
+                <a16:creationId xmlns:a16="http://schemas.microsoft.com/office/drawing/2014/main" id="{269BD85E-9696-4F53-E16D-B952973FC787}"/>
+              </a:ext>
+            </a:extLst>
+          </p:cNvPr>
+          <p:cNvPicPr>
+            <a:picLocks noChangeAspect="1"/>
+          </p:cNvPicPr>
+          <p:nvPr/>
+        </p:nvPicPr>
+        <p:blipFill>
+          <a:blip r:embed="rId13">
+            <a:extLst>
+              <a:ext uri="{28A0092B-C50C-407E-A947-70E740481C1C}">
+                <a14:useLocalDpi xmlns:a14="http://schemas.microsoft.com/office/drawing/2010/main" val="0"/>
+              </a:ext>
+            </a:extLst>
+          </a:blip>
+          <a:stretch>
+            <a:fillRect/>
+          </a:stretch>
+        </p:blipFill>
+        <p:spPr>
+          <a:xfrm>
+            <a:off x="6262080" y="319363"/>
+            <a:ext cx="610993" cy="610993"/>
+          </a:xfrm>
+          <a:prstGeom prst="rect">
+            <a:avLst/>
+          </a:prstGeom>
+        </p:spPr>
+      </p:pic>
+      <p:pic>
+        <p:nvPicPr>
+          <p:cNvPr id="23" name="Graphic 22" descr="Programmer male with solid fill">
+            <a:extLst>
+              <a:ext uri="{FF2B5EF4-FFF2-40B4-BE49-F238E27FC236}">
+                <a16:creationId xmlns:a16="http://schemas.microsoft.com/office/drawing/2014/main" id="{5A23DC12-B6DB-CF99-2EA0-2BFC6691D1F0}"/>
+              </a:ext>
+            </a:extLst>
+          </p:cNvPr>
+          <p:cNvPicPr>
+            <a:picLocks noChangeAspect="1"/>
+          </p:cNvPicPr>
+          <p:nvPr/>
+        </p:nvPicPr>
+        <p:blipFill>
+          <a:blip r:embed="rId14">
+            <a:extLst>
+              <a:ext uri="{28A0092B-C50C-407E-A947-70E740481C1C}">
+                <a14:useLocalDpi xmlns:a14="http://schemas.microsoft.com/office/drawing/2010/main" val="0"/>
+              </a:ext>
+              <a:ext uri="{96DAC541-7B7A-43D3-8B79-37D633B846F1}">
+                <asvg:svgBlip xmlns:asvg="http://schemas.microsoft.com/office/drawing/2016/SVG/main" r:embed="rId15"/>
+              </a:ext>
+            </a:extLst>
+          </a:blip>
+          <a:stretch>
+            <a:fillRect/>
+          </a:stretch>
+        </p:blipFill>
+        <p:spPr>
+          <a:xfrm>
+            <a:off x="8642727" y="549626"/>
+            <a:ext cx="2131338" cy="2131338"/>
+          </a:xfrm>
+          <a:prstGeom prst="rect">
+            <a:avLst/>
+          </a:prstGeom>
+        </p:spPr>
+      </p:pic>
+      <p:pic>
+        <p:nvPicPr>
+          <p:cNvPr id="25" name="Graphic 24" descr="Arrow Right with solid fill">
+            <a:extLst>
+              <a:ext uri="{FF2B5EF4-FFF2-40B4-BE49-F238E27FC236}">
+                <a16:creationId xmlns:a16="http://schemas.microsoft.com/office/drawing/2014/main" id="{C4C901D3-7967-B4C6-D9D2-43B761BE9B7D}"/>
+              </a:ext>
+            </a:extLst>
+          </p:cNvPr>
+          <p:cNvPicPr>
+            <a:picLocks noChangeAspect="1"/>
+          </p:cNvPicPr>
+          <p:nvPr/>
+        </p:nvPicPr>
+        <p:blipFill>
+          <a:blip r:embed="rId16">
+            <a:extLst>
+              <a:ext uri="{28A0092B-C50C-407E-A947-70E740481C1C}">
+                <a14:useLocalDpi xmlns:a14="http://schemas.microsoft.com/office/drawing/2010/main" val="0"/>
+              </a:ext>
+              <a:ext uri="{96DAC541-7B7A-43D3-8B79-37D633B846F1}">
+                <asvg:svgBlip xmlns:asvg="http://schemas.microsoft.com/office/drawing/2016/SVG/main" r:embed="rId17"/>
+              </a:ext>
+            </a:extLst>
+          </a:blip>
+          <a:stretch>
+            <a:fillRect/>
+          </a:stretch>
+        </p:blipFill>
+        <p:spPr>
+          <a:xfrm>
+            <a:off x="7907980" y="2808979"/>
+            <a:ext cx="914400" cy="914400"/>
+          </a:xfrm>
+          <a:prstGeom prst="rect">
+            <a:avLst/>
+          </a:prstGeom>
+        </p:spPr>
+      </p:pic>
+      <p:pic>
+        <p:nvPicPr>
+          <p:cNvPr id="26" name="Graphic 25" descr="Arrow Right with solid fill">
+            <a:extLst>
+              <a:ext uri="{FF2B5EF4-FFF2-40B4-BE49-F238E27FC236}">
+                <a16:creationId xmlns:a16="http://schemas.microsoft.com/office/drawing/2014/main" id="{10D378E7-4933-D3AB-F699-9F987CCE5D97}"/>
+              </a:ext>
+            </a:extLst>
+          </p:cNvPr>
+          <p:cNvPicPr>
+            <a:picLocks noChangeAspect="1"/>
+          </p:cNvPicPr>
+          <p:nvPr/>
+        </p:nvPicPr>
+        <p:blipFill>
+          <a:blip r:embed="rId16">
+            <a:extLst>
+              <a:ext uri="{28A0092B-C50C-407E-A947-70E740481C1C}">
+                <a14:useLocalDpi xmlns:a14="http://schemas.microsoft.com/office/drawing/2010/main" val="0"/>
+              </a:ext>
+              <a:ext uri="{96DAC541-7B7A-43D3-8B79-37D633B846F1}">
+                <asvg:svgBlip xmlns:asvg="http://schemas.microsoft.com/office/drawing/2016/SVG/main" r:embed="rId17"/>
+              </a:ext>
+            </a:extLst>
+          </a:blip>
+          <a:stretch>
+            <a:fillRect/>
+          </a:stretch>
+        </p:blipFill>
+        <p:spPr>
+          <a:xfrm>
+            <a:off x="2009861" y="2892065"/>
+            <a:ext cx="914400" cy="914400"/>
+          </a:xfrm>
+          <a:prstGeom prst="rect">
+            <a:avLst/>
+          </a:prstGeom>
+        </p:spPr>
+      </p:pic>
+      <p:pic>
+        <p:nvPicPr>
+          <p:cNvPr id="27" name="Graphic 26" descr="Arrow Right with solid fill">
+            <a:extLst>
+              <a:ext uri="{FF2B5EF4-FFF2-40B4-BE49-F238E27FC236}">
+                <a16:creationId xmlns:a16="http://schemas.microsoft.com/office/drawing/2014/main" id="{E159DDA7-D748-D46A-8F0A-F41E919CCB24}"/>
+              </a:ext>
+            </a:extLst>
+          </p:cNvPr>
+          <p:cNvPicPr>
+            <a:picLocks noChangeAspect="1"/>
+          </p:cNvPicPr>
+          <p:nvPr/>
+        </p:nvPicPr>
+        <p:blipFill>
+          <a:blip r:embed="rId16">
+            <a:extLst>
+              <a:ext uri="{28A0092B-C50C-407E-A947-70E740481C1C}">
+                <a14:useLocalDpi xmlns:a14="http://schemas.microsoft.com/office/drawing/2010/main" val="0"/>
+              </a:ext>
+              <a:ext uri="{96DAC541-7B7A-43D3-8B79-37D633B846F1}">
+                <asvg:svgBlip xmlns:asvg="http://schemas.microsoft.com/office/drawing/2016/SVG/main" r:embed="rId17"/>
+              </a:ext>
+            </a:extLst>
+          </a:blip>
+          <a:stretch>
+            <a:fillRect/>
+          </a:stretch>
+        </p:blipFill>
+        <p:spPr>
+          <a:xfrm rot="16200000">
+            <a:off x="4960789" y="4038600"/>
+            <a:ext cx="914400" cy="914400"/>
+          </a:xfrm>
+          <a:prstGeom prst="rect">
+            <a:avLst/>
+          </a:prstGeom>
+        </p:spPr>
+      </p:pic>
+      <p:pic>
+        <p:nvPicPr>
+          <p:cNvPr id="28" name="Graphic 27" descr="Arrow Right with solid fill">
+            <a:extLst>
+              <a:ext uri="{FF2B5EF4-FFF2-40B4-BE49-F238E27FC236}">
+                <a16:creationId xmlns:a16="http://schemas.microsoft.com/office/drawing/2014/main" id="{BC8A5A42-9140-7226-7F2E-351877A67B14}"/>
+              </a:ext>
+            </a:extLst>
+          </p:cNvPr>
+          <p:cNvPicPr>
+            <a:picLocks noChangeAspect="1"/>
+          </p:cNvPicPr>
+          <p:nvPr/>
+        </p:nvPicPr>
+        <p:blipFill>
+          <a:blip r:embed="rId16">
+            <a:extLst>
+              <a:ext uri="{28A0092B-C50C-407E-A947-70E740481C1C}">
+                <a14:useLocalDpi xmlns:a14="http://schemas.microsoft.com/office/drawing/2010/main" val="0"/>
+              </a:ext>
+              <a:ext uri="{96DAC541-7B7A-43D3-8B79-37D633B846F1}">
+                <asvg:svgBlip xmlns:asvg="http://schemas.microsoft.com/office/drawing/2016/SVG/main" r:embed="rId17"/>
+              </a:ext>
+            </a:extLst>
+          </a:blip>
+          <a:stretch>
+            <a:fillRect/>
+          </a:stretch>
+        </p:blipFill>
+        <p:spPr>
+          <a:xfrm rot="5400000">
+            <a:off x="1576717" y="700895"/>
+            <a:ext cx="914400" cy="914400"/>
+          </a:xfrm>
+          <a:prstGeom prst="rect">
+            <a:avLst/>
+          </a:prstGeom>
+        </p:spPr>
+      </p:pic>
+      <p:pic>
+        <p:nvPicPr>
+          <p:cNvPr id="3" name="Graphic 2">
+            <a:extLst>
+              <a:ext uri="{FF2B5EF4-FFF2-40B4-BE49-F238E27FC236}">
+                <a16:creationId xmlns:a16="http://schemas.microsoft.com/office/drawing/2014/main" id="{E8954620-A788-D5E7-FB6B-4D1704D95300}"/>
+              </a:ext>
+            </a:extLst>
+          </p:cNvPr>
+          <p:cNvPicPr>
+            <a:picLocks noChangeAspect="1"/>
+          </p:cNvPicPr>
+          <p:nvPr/>
+        </p:nvPicPr>
+        <p:blipFill>
+          <a:blip r:embed="rId18">
+            <a:extLst>
+              <a:ext uri="{28A0092B-C50C-407E-A947-70E740481C1C}">
+                <a14:useLocalDpi xmlns:a14="http://schemas.microsoft.com/office/drawing/2010/main" val="0"/>
+              </a:ext>
+              <a:ext uri="{96DAC541-7B7A-43D3-8B79-37D633B846F1}">
+                <asvg:svgBlip xmlns:asvg="http://schemas.microsoft.com/office/drawing/2016/SVG/main" r:embed="rId19"/>
+              </a:ext>
+            </a:extLst>
+          </a:blip>
+          <a:stretch>
+            <a:fillRect/>
+          </a:stretch>
+        </p:blipFill>
+        <p:spPr>
+          <a:xfrm>
+            <a:off x="8757602" y="3429000"/>
+            <a:ext cx="2549873" cy="2549873"/>
+          </a:xfrm>
+          <a:prstGeom prst="rect">
+            <a:avLst/>
+          </a:prstGeom>
+        </p:spPr>
+      </p:pic>
+      <p:pic>
+        <p:nvPicPr>
+          <p:cNvPr id="6" name="Graphic 5">
+            <a:extLst>
+              <a:ext uri="{FF2B5EF4-FFF2-40B4-BE49-F238E27FC236}">
+                <a16:creationId xmlns:a16="http://schemas.microsoft.com/office/drawing/2014/main" id="{841075C9-416D-22D0-E714-7C0E2C0C8E68}"/>
+              </a:ext>
+            </a:extLst>
+          </p:cNvPr>
+          <p:cNvPicPr>
+            <a:picLocks noChangeAspect="1"/>
+          </p:cNvPicPr>
+          <p:nvPr/>
+        </p:nvPicPr>
+        <p:blipFill>
+          <a:blip r:embed="rId20" cstate="print">
+            <a:extLst>
+              <a:ext uri="{28A0092B-C50C-407E-A947-70E740481C1C}">
+                <a14:useLocalDpi xmlns:a14="http://schemas.microsoft.com/office/drawing/2010/main" val="0"/>
+              </a:ext>
+              <a:ext uri="{96DAC541-7B7A-43D3-8B79-37D633B846F1}">
+                <asvg:svgBlip xmlns:asvg="http://schemas.microsoft.com/office/drawing/2016/SVG/main" r:embed="rId21"/>
+              </a:ext>
+            </a:extLst>
+          </a:blip>
+          <a:stretch>
+            <a:fillRect/>
+          </a:stretch>
+        </p:blipFill>
+        <p:spPr>
+          <a:xfrm>
+            <a:off x="4828029" y="1304774"/>
+            <a:ext cx="1179919" cy="709839"/>
+          </a:xfrm>
+          <a:prstGeom prst="rect">
+            <a:avLst/>
+          </a:prstGeom>
+        </p:spPr>
+      </p:pic>
+      <p:pic>
+        <p:nvPicPr>
+          <p:cNvPr id="1026" name="Picture 2" descr="Bootstrap">
+            <a:extLst>
+              <a:ext uri="{FF2B5EF4-FFF2-40B4-BE49-F238E27FC236}">
+                <a16:creationId xmlns:a16="http://schemas.microsoft.com/office/drawing/2014/main" id="{934F6655-B139-D901-010D-115FD1557B7E}"/>
+              </a:ext>
+            </a:extLst>
+          </p:cNvPr>
+          <p:cNvPicPr>
+            <a:picLocks noChangeAspect="1" noChangeArrowheads="1"/>
+          </p:cNvPicPr>
+          <p:nvPr/>
+        </p:nvPicPr>
+        <p:blipFill>
+          <a:blip r:embed="rId22" cstate="print">
+            <a:extLst>
+              <a:ext uri="{28A0092B-C50C-407E-A947-70E740481C1C}">
+                <a14:useLocalDpi xmlns:a14="http://schemas.microsoft.com/office/drawing/2010/main" val="0"/>
+              </a:ext>
+            </a:extLst>
+          </a:blip>
+          <a:srcRect/>
+          <a:stretch>
+            <a:fillRect/>
+          </a:stretch>
+        </p:blipFill>
+        <p:spPr bwMode="auto">
+          <a:xfrm>
+            <a:off x="6377099" y="1158095"/>
+            <a:ext cx="1411996" cy="1164897"/>
+          </a:xfrm>
+          <a:prstGeom prst="rect">
+            <a:avLst/>
+          </a:prstGeom>
+          <a:noFill/>
+          <a:extLst>
+            <a:ext uri="{909E8E84-426E-40DD-AFC4-6F175D3DCCD1}">
+              <a14:hiddenFill xmlns:a14="http://schemas.microsoft.com/office/drawing/2010/main">
+                <a:solidFill>
+                  <a:srgbClr val="FFFFFF"/>
+                </a:solidFill>
+              </a14:hiddenFill>
+            </a:ext>
+          </a:extLst>
+        </p:spPr>
+      </p:pic>
+      <p:sp>
+        <p:nvSpPr>
+          <p:cNvPr id="38" name="object 3">
+            <a:extLst>
+              <a:ext uri="{FF2B5EF4-FFF2-40B4-BE49-F238E27FC236}">
+                <a16:creationId xmlns:a16="http://schemas.microsoft.com/office/drawing/2014/main" id="{106796A9-E093-E67D-1AFC-B1C4BFC812F6}"/>
+              </a:ext>
+            </a:extLst>
+          </p:cNvPr>
+          <p:cNvSpPr/>
+          <p:nvPr/>
+        </p:nvSpPr>
+        <p:spPr>
+          <a:xfrm>
+            <a:off x="61912" y="71437"/>
+            <a:ext cx="12077700" cy="6724650"/>
+          </a:xfrm>
+          <a:custGeom>
+            <a:avLst/>
+            <a:gdLst/>
+            <a:ahLst/>
+            <a:cxnLst/>
+            <a:rect l="l" t="t" r="r" b="b"/>
+            <a:pathLst>
+              <a:path w="12077700" h="6724650">
+                <a:moveTo>
+                  <a:pt x="0" y="6724650"/>
+                </a:moveTo>
+                <a:lnTo>
+                  <a:pt x="12077700" y="6724650"/>
+                </a:lnTo>
+                <a:lnTo>
+                  <a:pt x="12077700" y="0"/>
+                </a:lnTo>
+                <a:lnTo>
+                  <a:pt x="0" y="0"/>
+                </a:lnTo>
+                <a:lnTo>
+                  <a:pt x="0" y="6724650"/>
+                </a:lnTo>
+                <a:close/>
+              </a:path>
+            </a:pathLst>
+          </a:custGeom>
+          <a:ln w="28575">
+            <a:solidFill>
+              <a:srgbClr val="0078D3"/>
+            </a:solidFill>
+          </a:ln>
+        </p:spPr>
+        <p:txBody>
+          <a:bodyPr wrap="square" lIns="0" tIns="0" rIns="0" bIns="0" rtlCol="0"/>
+          <a:lstStyle/>
+          <a:p>
+            <a:endParaRPr/>
+          </a:p>
+        </p:txBody>
+      </p:sp>
+    </p:spTree>
+    <p:extLst>
+      <p:ext uri="{BB962C8B-B14F-4D97-AF65-F5344CB8AC3E}">
+        <p14:creationId xmlns:p14="http://schemas.microsoft.com/office/powerpoint/2010/main" val="3079519827"/>
+      </p:ext>
+    </p:extLst>
+  </p:cSld>
+  <p:clrMapOvr>
+    <a:masterClrMapping/>
+  </p:clrMapOvr>
+</p:sld>
+</file>
+
+<file path=ppt/slides/slide5.xml><?xml version="1.0" encoding="utf-8"?>
+<p:sld xmlns:a="http://schemas.openxmlformats.org/drawingml/2006/main" xmlns:r="http://schemas.openxmlformats.org/officeDocument/2006/relationships" xmlns:p="http://schemas.openxmlformats.org/presentationml/2006/main" showMasterSp="0">
+  <p:cSld>
+    <p:bg>
+      <p:bgPr>
+        <a:blipFill dpi="0" rotWithShape="1">
+          <a:blip r:embed="rId3">
+            <a:alphaModFix amt="50000"/>
+            <a:lum/>
+          </a:blip>
+          <a:srcRect/>
+          <a:stretch>
+            <a:fillRect t="-9000" b="-9000"/>
+          </a:stretch>
+        </a:blipFill>
+        <a:effectLst/>
+      </p:bgPr>
+    </p:bg>
+    <p:spTree>
+      <p:nvGrpSpPr>
+        <p:cNvPr id="1" name=""/>
+        <p:cNvGrpSpPr/>
+        <p:nvPr/>
+      </p:nvGrpSpPr>
+      <p:grpSpPr>
+        <a:xfrm>
+          <a:off x="0" y="0"/>
+          <a:ext cx="0" cy="0"/>
+          <a:chOff x="0" y="0"/>
+          <a:chExt cx="0" cy="0"/>
+        </a:xfrm>
+      </p:grpSpPr>
+      <p:pic>
+        <p:nvPicPr>
+          <p:cNvPr id="5" name="Picture 4" descr="Logo&#10;&#10;Description automatically generated">
+            <a:extLst>
+              <a:ext uri="{FF2B5EF4-FFF2-40B4-BE49-F238E27FC236}">
+                <a16:creationId xmlns:a16="http://schemas.microsoft.com/office/drawing/2014/main" id="{8D74796E-1DAE-9745-DF87-B74BB2C9B98F}"/>
+              </a:ext>
+            </a:extLst>
+          </p:cNvPr>
+          <p:cNvPicPr>
+            <a:picLocks noChangeAspect="1"/>
+          </p:cNvPicPr>
+          <p:nvPr/>
+        </p:nvPicPr>
+        <p:blipFill>
+          <a:blip r:embed="rId4" cstate="print">
+            <a:extLst>
+              <a:ext uri="{28A0092B-C50C-407E-A947-70E740481C1C}">
+                <a14:useLocalDpi xmlns:a14="http://schemas.microsoft.com/office/drawing/2010/main" val="0"/>
+              </a:ext>
+            </a:extLst>
+          </a:blip>
+          <a:stretch>
+            <a:fillRect/>
+          </a:stretch>
+        </p:blipFill>
+        <p:spPr>
+          <a:xfrm>
+            <a:off x="10668000" y="264962"/>
+            <a:ext cx="1223158" cy="974158"/>
+          </a:xfrm>
+          <a:prstGeom prst="rect">
+            <a:avLst/>
+          </a:prstGeom>
+        </p:spPr>
+      </p:pic>
+      <p:pic>
+        <p:nvPicPr>
+          <p:cNvPr id="7" name="Graphic 6">
+            <a:extLst>
+              <a:ext uri="{FF2B5EF4-FFF2-40B4-BE49-F238E27FC236}">
+                <a16:creationId xmlns:a16="http://schemas.microsoft.com/office/drawing/2014/main" id="{E1425F46-8E0F-58DA-67F8-1336B2FD076B}"/>
+              </a:ext>
+            </a:extLst>
+          </p:cNvPr>
+          <p:cNvPicPr>
+            <a:picLocks noChangeAspect="1"/>
+          </p:cNvPicPr>
+          <p:nvPr/>
+        </p:nvPicPr>
+        <p:blipFill>
+          <a:blip r:embed="rId5" cstate="print">
+            <a:extLst>
+              <a:ext uri="{28A0092B-C50C-407E-A947-70E740481C1C}">
+                <a14:useLocalDpi xmlns:a14="http://schemas.microsoft.com/office/drawing/2010/main" val="0"/>
+              </a:ext>
+              <a:ext uri="{96DAC541-7B7A-43D3-8B79-37D633B846F1}">
+                <asvg:svgBlip xmlns:asvg="http://schemas.microsoft.com/office/drawing/2016/SVG/main" r:embed="rId6"/>
+              </a:ext>
+            </a:extLst>
+          </a:blip>
+          <a:stretch>
+            <a:fillRect/>
+          </a:stretch>
+        </p:blipFill>
+        <p:spPr>
+          <a:xfrm>
             <a:off x="6252683" y="2336235"/>
             <a:ext cx="1179920" cy="1664693"/>
           </a:xfrm>
@@ -6138,8 +7079,8 @@
         </p:blipFill>
         <p:spPr>
           <a:xfrm>
-            <a:off x="9180920" y="2199379"/>
-            <a:ext cx="2096680" cy="2096680"/>
+            <a:off x="7512648" y="547102"/>
+            <a:ext cx="610993" cy="610993"/>
           </a:xfrm>
           <a:prstGeom prst="rect">
             <a:avLst/>
@@ -6335,6 +7276,84 @@
           <a:xfrm rot="5400000">
             <a:off x="4960789" y="1451151"/>
             <a:ext cx="914400" cy="914400"/>
+          </a:xfrm>
+          <a:prstGeom prst="rect">
+            <a:avLst/>
+          </a:prstGeom>
+        </p:spPr>
+      </p:pic>
+      <p:pic>
+        <p:nvPicPr>
+          <p:cNvPr id="3" name="Graphic 2">
+            <a:extLst>
+              <a:ext uri="{FF2B5EF4-FFF2-40B4-BE49-F238E27FC236}">
+                <a16:creationId xmlns:a16="http://schemas.microsoft.com/office/drawing/2014/main" id="{E8954620-A788-D5E7-FB6B-4D1704D95300}"/>
+              </a:ext>
+            </a:extLst>
+          </p:cNvPr>
+          <p:cNvPicPr>
+            <a:picLocks noChangeAspect="1"/>
+          </p:cNvPicPr>
+          <p:nvPr/>
+        </p:nvPicPr>
+        <p:blipFill>
+          <a:blip r:embed="rId19">
+            <a:extLst>
+              <a:ext uri="{28A0092B-C50C-407E-A947-70E740481C1C}">
+                <a14:useLocalDpi xmlns:a14="http://schemas.microsoft.com/office/drawing/2010/main" val="0"/>
+              </a:ext>
+              <a:ext uri="{96DAC541-7B7A-43D3-8B79-37D633B846F1}">
+                <asvg:svgBlip xmlns:asvg="http://schemas.microsoft.com/office/drawing/2016/SVG/main" r:embed="rId20"/>
+              </a:ext>
+            </a:extLst>
+          </a:blip>
+          <a:stretch>
+            <a:fillRect/>
+          </a:stretch>
+        </p:blipFill>
+        <p:spPr>
+          <a:xfrm>
+            <a:off x="9144000" y="2154063"/>
+            <a:ext cx="2549873" cy="2549873"/>
+          </a:xfrm>
+          <a:prstGeom prst="rect">
+            <a:avLst/>
+          </a:prstGeom>
+        </p:spPr>
+      </p:pic>
+      <p:pic>
+        <p:nvPicPr>
+          <p:cNvPr id="6" name="Graphic 5">
+            <a:extLst>
+              <a:ext uri="{FF2B5EF4-FFF2-40B4-BE49-F238E27FC236}">
+                <a16:creationId xmlns:a16="http://schemas.microsoft.com/office/drawing/2014/main" id="{841075C9-416D-22D0-E714-7C0E2C0C8E68}"/>
+              </a:ext>
+            </a:extLst>
+          </p:cNvPr>
+          <p:cNvPicPr>
+            <a:picLocks noChangeAspect="1"/>
+          </p:cNvPicPr>
+          <p:nvPr/>
+        </p:nvPicPr>
+        <p:blipFill>
+          <a:blip r:embed="rId21" cstate="print">
+            <a:extLst>
+              <a:ext uri="{28A0092B-C50C-407E-A947-70E740481C1C}">
+                <a14:useLocalDpi xmlns:a14="http://schemas.microsoft.com/office/drawing/2010/main" val="0"/>
+              </a:ext>
+              <a:ext uri="{96DAC541-7B7A-43D3-8B79-37D633B846F1}">
+                <asvg:svgBlip xmlns:asvg="http://schemas.microsoft.com/office/drawing/2016/SVG/main" r:embed="rId22"/>
+              </a:ext>
+            </a:extLst>
+          </a:blip>
+          <a:stretch>
+            <a:fillRect/>
+          </a:stretch>
+        </p:blipFill>
+        <p:spPr>
+          <a:xfrm>
+            <a:off x="6252684" y="1264914"/>
+            <a:ext cx="1179919" cy="709839"/>
           </a:xfrm>
           <a:prstGeom prst="rect">
             <a:avLst/>
@@ -6354,7 +7373,7 @@
 </p:sld>
 </file>
 
-<file path=ppt/slides/slide5.xml><?xml version="1.0" encoding="utf-8"?>
+<file path=ppt/slides/slide6.xml><?xml version="1.0" encoding="utf-8"?>
 <p:sld xmlns:a="http://schemas.openxmlformats.org/drawingml/2006/main" xmlns:r="http://schemas.openxmlformats.org/officeDocument/2006/relationships" xmlns:p="http://schemas.openxmlformats.org/presentationml/2006/main">
   <p:cSld>
     <p:bg>
@@ -6617,7 +7636,7 @@
                   <a:srgbClr val="000000"/>
                 </a:solidFill>
               </a:rPr>
-              <a:t>Web Site</a:t>
+              <a:t>Prototype</a:t>
             </a:r>
             <a:endParaRPr lang="en-US" spc="-45" dirty="0">
               <a:solidFill>
@@ -6643,7 +7662,108 @@
         </p:nvSpPr>
         <p:spPr>
           <a:xfrm>
-            <a:off x="1676400" y="3310663"/>
+            <a:off x="1752600" y="3137816"/>
+            <a:ext cx="9753600" cy="1121461"/>
+          </a:xfrm>
+          <a:prstGeom prst="rect">
+            <a:avLst/>
+          </a:prstGeom>
+        </p:spPr>
+        <p:txBody>
+          <a:bodyPr vert="horz" wrap="square" lIns="0" tIns="13335" rIns="0" bIns="0" rtlCol="0">
+            <a:spAutoFit/>
+          </a:bodyPr>
+          <a:lstStyle>
+            <a:lvl1pPr>
+              <a:defRPr sz="3600" b="1" i="0">
+                <a:solidFill>
+                  <a:srgbClr val="50E6FF"/>
+                </a:solidFill>
+                <a:latin typeface="Segoe UI Semibold"/>
+                <a:ea typeface="+mj-ea"/>
+                <a:cs typeface="Segoe UI Semibold"/>
+              </a:defRPr>
+            </a:lvl1pPr>
+          </a:lstStyle>
+          <a:p>
+            <a:pPr marL="12700">
+              <a:spcBef>
+                <a:spcPts val="105"/>
+              </a:spcBef>
+            </a:pPr>
+            <a:r>
+              <a:rPr lang="en-US" spc="-50" dirty="0">
+                <a:solidFill>
+                  <a:srgbClr val="000000"/>
+                </a:solidFill>
+                <a:hlinkClick r:id="rId5"/>
+              </a:rPr>
+              <a:t>https://nice-smoke-051dd3710.2.azurestaticapps.net/</a:t>
+            </a:r>
+            <a:endParaRPr lang="en-US" spc="-45" dirty="0">
+              <a:solidFill>
+                <a:srgbClr val="000000"/>
+              </a:solidFill>
+            </a:endParaRPr>
+          </a:p>
+        </p:txBody>
+      </p:sp>
+      <p:pic>
+        <p:nvPicPr>
+          <p:cNvPr id="18" name="Graphic 17" descr="Blog with solid fill">
+            <a:extLst>
+              <a:ext uri="{FF2B5EF4-FFF2-40B4-BE49-F238E27FC236}">
+                <a16:creationId xmlns:a16="http://schemas.microsoft.com/office/drawing/2014/main" id="{C99E9924-DA35-58D8-F0CB-5169A83C8EA8}"/>
+              </a:ext>
+            </a:extLst>
+          </p:cNvPr>
+          <p:cNvPicPr>
+            <a:picLocks noChangeAspect="1"/>
+          </p:cNvPicPr>
+          <p:nvPr/>
+        </p:nvPicPr>
+        <p:blipFill>
+          <a:blip r:embed="rId6">
+            <a:extLst>
+              <a:ext uri="{28A0092B-C50C-407E-A947-70E740481C1C}">
+                <a14:useLocalDpi xmlns:a14="http://schemas.microsoft.com/office/drawing/2010/main" val="0"/>
+              </a:ext>
+              <a:ext uri="{96DAC541-7B7A-43D3-8B79-37D633B846F1}">
+                <asvg:svgBlip xmlns:asvg="http://schemas.microsoft.com/office/drawing/2016/SVG/main" r:embed="rId7"/>
+              </a:ext>
+            </a:extLst>
+          </a:blip>
+          <a:stretch>
+            <a:fillRect/>
+          </a:stretch>
+        </p:blipFill>
+        <p:spPr>
+          <a:xfrm>
+            <a:off x="4114800" y="118529"/>
+            <a:ext cx="1120591" cy="1120591"/>
+          </a:xfrm>
+          <a:prstGeom prst="rect">
+            <a:avLst/>
+          </a:prstGeom>
+        </p:spPr>
+      </p:pic>
+      <p:sp>
+        <p:nvSpPr>
+          <p:cNvPr id="2" name="object 2">
+            <a:extLst>
+              <a:ext uri="{FF2B5EF4-FFF2-40B4-BE49-F238E27FC236}">
+                <a16:creationId xmlns:a16="http://schemas.microsoft.com/office/drawing/2014/main" id="{353EE539-20A4-E970-6BBD-952B6E2D9505}"/>
+              </a:ext>
+            </a:extLst>
+          </p:cNvPr>
+          <p:cNvSpPr txBox="1">
+            <a:spLocks/>
+          </p:cNvSpPr>
+          <p:nvPr/>
+        </p:nvSpPr>
+        <p:spPr>
+          <a:xfrm>
+            <a:off x="1752600" y="4761675"/>
             <a:ext cx="9753600" cy="567463"/>
           </a:xfrm>
           <a:prstGeom prst="rect">
@@ -6673,13 +7793,10 @@
               </a:spcBef>
             </a:pPr>
             <a:r>
-              <a:rPr lang="en-US" spc="-50" dirty="0">
-                <a:solidFill>
-                  <a:srgbClr val="000000"/>
-                </a:solidFill>
-                <a:hlinkClick r:id="rId5"/>
+              <a:rPr lang="en-US" dirty="0">
+                <a:hlinkClick r:id="rId8"/>
               </a:rPr>
-              <a:t>https://greentech.omprakashsharma.com.np</a:t>
+              <a:t>https://plantwizards.ml/</a:t>
             </a:r>
             <a:endParaRPr lang="en-US" spc="-45" dirty="0">
               <a:solidFill>
@@ -6689,45 +7806,6 @@
           </a:p>
         </p:txBody>
       </p:sp>
-      <p:pic>
-        <p:nvPicPr>
-          <p:cNvPr id="18" name="Graphic 17" descr="Blog with solid fill">
-            <a:extLst>
-              <a:ext uri="{FF2B5EF4-FFF2-40B4-BE49-F238E27FC236}">
-                <a16:creationId xmlns:a16="http://schemas.microsoft.com/office/drawing/2014/main" id="{C99E9924-DA35-58D8-F0CB-5169A83C8EA8}"/>
-              </a:ext>
-            </a:extLst>
-          </p:cNvPr>
-          <p:cNvPicPr>
-            <a:picLocks noChangeAspect="1"/>
-          </p:cNvPicPr>
-          <p:nvPr/>
-        </p:nvPicPr>
-        <p:blipFill>
-          <a:blip r:embed="rId6">
-            <a:extLst>
-              <a:ext uri="{28A0092B-C50C-407E-A947-70E740481C1C}">
-                <a14:useLocalDpi xmlns:a14="http://schemas.microsoft.com/office/drawing/2010/main" val="0"/>
-              </a:ext>
-              <a:ext uri="{96DAC541-7B7A-43D3-8B79-37D633B846F1}">
-                <asvg:svgBlip xmlns:asvg="http://schemas.microsoft.com/office/drawing/2016/SVG/main" r:embed="rId7"/>
-              </a:ext>
-            </a:extLst>
-          </a:blip>
-          <a:stretch>
-            <a:fillRect/>
-          </a:stretch>
-        </p:blipFill>
-        <p:spPr>
-          <a:xfrm>
-            <a:off x="4114800" y="118529"/>
-            <a:ext cx="1120591" cy="1120591"/>
-          </a:xfrm>
-          <a:prstGeom prst="rect">
-            <a:avLst/>
-          </a:prstGeom>
-        </p:spPr>
-      </p:pic>
     </p:spTree>
     <p:extLst>
       <p:ext uri="{BB962C8B-B14F-4D97-AF65-F5344CB8AC3E}">
@@ -6741,13 +7819,13 @@
 </p:sld>
 </file>
 
-<file path=ppt/slides/slide6.xml><?xml version="1.0" encoding="utf-8"?>
+<file path=ppt/slides/slide7.xml><?xml version="1.0" encoding="utf-8"?>
 <p:sld xmlns:a="http://schemas.openxmlformats.org/drawingml/2006/main" xmlns:r="http://schemas.openxmlformats.org/officeDocument/2006/relationships" xmlns:p="http://schemas.openxmlformats.org/presentationml/2006/main">
   <p:cSld>
     <p:bg>
       <p:bgPr>
         <a:blipFill dpi="0" rotWithShape="1">
-          <a:blip r:embed="rId2">
+          <a:blip r:embed="rId3">
             <a:alphaModFix amt="50000"/>
             <a:lum/>
           </a:blip>
@@ -6889,7 +7967,7 @@
           <p:nvPr/>
         </p:nvPicPr>
         <p:blipFill>
-          <a:blip r:embed="rId3" cstate="print">
+          <a:blip r:embed="rId4" cstate="print">
             <a:extLst>
               <a:ext uri="{28A0092B-C50C-407E-A947-70E740481C1C}">
                 <a14:useLocalDpi xmlns:a14="http://schemas.microsoft.com/office/drawing/2010/main" val="0"/>
@@ -6924,8 +8002,8 @@
         </p:nvSpPr>
         <p:spPr>
           <a:xfrm>
-            <a:off x="2063279" y="2133600"/>
-            <a:ext cx="9216300" cy="3304110"/>
+            <a:off x="2063279" y="1447800"/>
+            <a:ext cx="9216300" cy="5458546"/>
           </a:xfrm>
           <a:prstGeom prst="rect">
             <a:avLst/>
@@ -6962,7 +8040,7 @@
                 <a:spcPts val="565"/>
               </a:spcBef>
             </a:pPr>
-            <a:endParaRPr lang="en-US" sz="2000" b="1" spc="-20" dirty="0">
+            <a:endParaRPr lang="en-US" sz="1000" b="1" spc="-20" dirty="0">
               <a:latin typeface="Segoe UI"/>
               <a:cs typeface="Segoe UI"/>
             </a:endParaRPr>
@@ -6976,7 +8054,21 @@
                 <a:spcPts val="565"/>
               </a:spcBef>
             </a:pPr>
-            <a:endParaRPr lang="en-US" sz="2000" b="1" spc="-20" dirty="0">
+            <a:endParaRPr lang="en-US" sz="1000" b="1" spc="-20" dirty="0">
+              <a:latin typeface="Segoe UI"/>
+              <a:cs typeface="Segoe UI"/>
+            </a:endParaRPr>
+          </a:p>
+          <a:p>
+            <a:pPr marL="12700">
+              <a:lnSpc>
+                <a:spcPct val="100000"/>
+              </a:lnSpc>
+              <a:spcBef>
+                <a:spcPts val="565"/>
+              </a:spcBef>
+            </a:pPr>
+            <a:endParaRPr lang="en-US" sz="1000" b="1" spc="-20" dirty="0">
               <a:latin typeface="Segoe UI"/>
               <a:cs typeface="Segoe UI"/>
             </a:endParaRPr>
@@ -6995,7 +8087,7 @@
                 <a:latin typeface="Segoe UI"/>
                 <a:cs typeface="Segoe UI"/>
               </a:rPr>
-              <a:t>Find out the information of plants by scanning.</a:t>
+              <a:t>Find out the information of plants by scanning its image</a:t>
             </a:r>
           </a:p>
           <a:p>
@@ -7007,7 +8099,7 @@
                 <a:spcPts val="565"/>
               </a:spcBef>
             </a:pPr>
-            <a:endParaRPr lang="en-US" sz="2000" b="1" spc="-20" dirty="0">
+            <a:endParaRPr lang="en-US" sz="1000" b="1" spc="-20" dirty="0">
               <a:latin typeface="Segoe UI"/>
               <a:cs typeface="Segoe UI"/>
             </a:endParaRPr>
@@ -7021,7 +8113,21 @@
                 <a:spcPts val="565"/>
               </a:spcBef>
             </a:pPr>
-            <a:endParaRPr lang="en-US" sz="2000" b="1" spc="-20" dirty="0">
+            <a:endParaRPr lang="en-US" sz="1000" b="1" spc="-20" dirty="0">
+              <a:latin typeface="Segoe UI"/>
+              <a:cs typeface="Segoe UI"/>
+            </a:endParaRPr>
+          </a:p>
+          <a:p>
+            <a:pPr marL="12700">
+              <a:lnSpc>
+                <a:spcPct val="100000"/>
+              </a:lnSpc>
+              <a:spcBef>
+                <a:spcPts val="565"/>
+              </a:spcBef>
+            </a:pPr>
+            <a:endParaRPr lang="en-US" sz="1000" b="1" spc="-20" dirty="0">
               <a:latin typeface="Segoe UI"/>
               <a:cs typeface="Segoe UI"/>
             </a:endParaRPr>
@@ -7040,8 +8146,154 @@
                 <a:latin typeface="Segoe UI"/>
                 <a:cs typeface="Segoe UI"/>
               </a:rPr>
-              <a:t>Use Mixed Reality to visualize how the space for cultivating the plants will look after the actual plantation.</a:t>
+              <a:t>Use Mixed Reality visualize how the space will look after the actual plantation.</a:t>
             </a:r>
+          </a:p>
+          <a:p>
+            <a:pPr marL="12700">
+              <a:lnSpc>
+                <a:spcPct val="100000"/>
+              </a:lnSpc>
+              <a:spcBef>
+                <a:spcPts val="565"/>
+              </a:spcBef>
+            </a:pPr>
+            <a:endParaRPr lang="en-US" sz="1000" b="1" spc="-20" dirty="0">
+              <a:latin typeface="Segoe UI"/>
+              <a:cs typeface="Segoe UI"/>
+            </a:endParaRPr>
+          </a:p>
+          <a:p>
+            <a:pPr marL="12700">
+              <a:lnSpc>
+                <a:spcPct val="100000"/>
+              </a:lnSpc>
+              <a:spcBef>
+                <a:spcPts val="565"/>
+              </a:spcBef>
+            </a:pPr>
+            <a:endParaRPr lang="en-US" sz="1000" b="1" spc="-20" dirty="0">
+              <a:latin typeface="Segoe UI"/>
+              <a:cs typeface="Segoe UI"/>
+            </a:endParaRPr>
+          </a:p>
+          <a:p>
+            <a:pPr marL="12700">
+              <a:lnSpc>
+                <a:spcPct val="100000"/>
+              </a:lnSpc>
+              <a:spcBef>
+                <a:spcPts val="565"/>
+              </a:spcBef>
+            </a:pPr>
+            <a:endParaRPr lang="en-US" sz="1000" b="1" spc="-20" dirty="0">
+              <a:latin typeface="Segoe UI"/>
+              <a:cs typeface="Segoe UI"/>
+            </a:endParaRPr>
+          </a:p>
+          <a:p>
+            <a:pPr marL="12700">
+              <a:lnSpc>
+                <a:spcPct val="100000"/>
+              </a:lnSpc>
+              <a:spcBef>
+                <a:spcPts val="565"/>
+              </a:spcBef>
+            </a:pPr>
+            <a:r>
+              <a:rPr lang="en-US" sz="2000" b="1" spc="-20" dirty="0">
+                <a:latin typeface="Segoe UI"/>
+                <a:cs typeface="Segoe UI"/>
+              </a:rPr>
+              <a:t>Integrate local vendors to supply the plants as per the requirement</a:t>
+            </a:r>
+          </a:p>
+          <a:p>
+            <a:pPr marL="12700">
+              <a:lnSpc>
+                <a:spcPct val="100000"/>
+              </a:lnSpc>
+              <a:spcBef>
+                <a:spcPts val="565"/>
+              </a:spcBef>
+            </a:pPr>
+            <a:endParaRPr lang="en-US" sz="1000" b="1" spc="-20" dirty="0">
+              <a:latin typeface="Segoe UI"/>
+              <a:cs typeface="Segoe UI"/>
+            </a:endParaRPr>
+          </a:p>
+          <a:p>
+            <a:pPr marL="12700">
+              <a:lnSpc>
+                <a:spcPct val="100000"/>
+              </a:lnSpc>
+              <a:spcBef>
+                <a:spcPts val="565"/>
+              </a:spcBef>
+            </a:pPr>
+            <a:endParaRPr lang="en-US" sz="1000" b="1" spc="-20" dirty="0">
+              <a:latin typeface="Segoe UI"/>
+              <a:cs typeface="Segoe UI"/>
+            </a:endParaRPr>
+          </a:p>
+          <a:p>
+            <a:pPr marL="12700">
+              <a:lnSpc>
+                <a:spcPct val="100000"/>
+              </a:lnSpc>
+              <a:spcBef>
+                <a:spcPts val="565"/>
+              </a:spcBef>
+            </a:pPr>
+            <a:endParaRPr lang="en-US" sz="1000" b="1" spc="-20" dirty="0">
+              <a:latin typeface="Segoe UI"/>
+              <a:cs typeface="Segoe UI"/>
+            </a:endParaRPr>
+          </a:p>
+          <a:p>
+            <a:pPr marL="12700">
+              <a:lnSpc>
+                <a:spcPct val="100000"/>
+              </a:lnSpc>
+              <a:spcBef>
+                <a:spcPts val="565"/>
+              </a:spcBef>
+            </a:pPr>
+            <a:r>
+              <a:rPr lang="en-US" sz="2000" b="1" spc="-20" dirty="0">
+                <a:latin typeface="Segoe UI"/>
+                <a:cs typeface="Segoe UI"/>
+              </a:rPr>
+              <a:t>Make the Web App available for mobile users</a:t>
+            </a:r>
+          </a:p>
+          <a:p>
+            <a:pPr marL="12700">
+              <a:lnSpc>
+                <a:spcPct val="100000"/>
+              </a:lnSpc>
+              <a:spcBef>
+                <a:spcPts val="565"/>
+              </a:spcBef>
+            </a:pPr>
+            <a:endParaRPr lang="en-US" sz="1000" b="1" spc="-20" dirty="0">
+              <a:latin typeface="Segoe UI"/>
+              <a:cs typeface="Segoe UI"/>
+            </a:endParaRPr>
+          </a:p>
+          <a:p>
+            <a:pPr marL="12700">
+              <a:lnSpc>
+                <a:spcPct val="100000"/>
+              </a:lnSpc>
+              <a:spcBef>
+                <a:spcPts val="565"/>
+              </a:spcBef>
+            </a:pPr>
+            <a:endParaRPr lang="en-US" sz="1000" b="1" spc="-20" dirty="0">
+              <a:latin typeface="Segoe UI"/>
+              <a:cs typeface="Segoe UI"/>
+            </a:endParaRPr>
           </a:p>
         </p:txBody>
       </p:sp>
@@ -7060,13 +8312,13 @@
           <p:nvPr/>
         </p:nvPicPr>
         <p:blipFill>
-          <a:blip r:embed="rId4">
+          <a:blip r:embed="rId5">
             <a:extLst>
               <a:ext uri="{28A0092B-C50C-407E-A947-70E740481C1C}">
                 <a14:useLocalDpi xmlns:a14="http://schemas.microsoft.com/office/drawing/2010/main" val="0"/>
               </a:ext>
               <a:ext uri="{96DAC541-7B7A-43D3-8B79-37D633B846F1}">
-                <asvg:svgBlip xmlns:asvg="http://schemas.microsoft.com/office/drawing/2016/SVG/main" r:embed="rId5"/>
+                <asvg:svgBlip xmlns:asvg="http://schemas.microsoft.com/office/drawing/2016/SVG/main" r:embed="rId6"/>
               </a:ext>
             </a:extLst>
           </a:blip>
@@ -7076,7 +8328,7 @@
         </p:blipFill>
         <p:spPr>
           <a:xfrm>
-            <a:off x="905305" y="1905000"/>
+            <a:off x="1020994" y="1295400"/>
             <a:ext cx="914400" cy="914400"/>
           </a:xfrm>
           <a:prstGeom prst="rect">
@@ -7099,13 +8351,13 @@
           <p:nvPr/>
         </p:nvPicPr>
         <p:blipFill>
-          <a:blip r:embed="rId6">
+          <a:blip r:embed="rId7">
             <a:extLst>
               <a:ext uri="{28A0092B-C50C-407E-A947-70E740481C1C}">
                 <a14:useLocalDpi xmlns:a14="http://schemas.microsoft.com/office/drawing/2010/main" val="0"/>
               </a:ext>
               <a:ext uri="{96DAC541-7B7A-43D3-8B79-37D633B846F1}">
-                <asvg:svgBlip xmlns:asvg="http://schemas.microsoft.com/office/drawing/2016/SVG/main" r:embed="rId7"/>
+                <asvg:svgBlip xmlns:asvg="http://schemas.microsoft.com/office/drawing/2016/SVG/main" r:embed="rId8"/>
               </a:ext>
             </a:extLst>
           </a:blip>
@@ -7115,7 +8367,7 @@
         </p:blipFill>
         <p:spPr>
           <a:xfrm>
-            <a:off x="990600" y="3276601"/>
+            <a:off x="1020994" y="2514600"/>
             <a:ext cx="914400" cy="914400"/>
           </a:xfrm>
           <a:prstGeom prst="rect">
@@ -7138,13 +8390,13 @@
           <p:nvPr/>
         </p:nvPicPr>
         <p:blipFill>
-          <a:blip r:embed="rId8">
+          <a:blip r:embed="rId9">
             <a:extLst>
               <a:ext uri="{28A0092B-C50C-407E-A947-70E740481C1C}">
                 <a14:useLocalDpi xmlns:a14="http://schemas.microsoft.com/office/drawing/2010/main" val="0"/>
               </a:ext>
               <a:ext uri="{96DAC541-7B7A-43D3-8B79-37D633B846F1}">
-                <asvg:svgBlip xmlns:asvg="http://schemas.microsoft.com/office/drawing/2016/SVG/main" r:embed="rId9"/>
+                <asvg:svgBlip xmlns:asvg="http://schemas.microsoft.com/office/drawing/2016/SVG/main" r:embed="rId10"/>
               </a:ext>
             </a:extLst>
           </a:blip>
@@ -7154,8 +8406,86 @@
         </p:blipFill>
         <p:spPr>
           <a:xfrm>
-            <a:off x="1066800" y="4648200"/>
+            <a:off x="1020994" y="3581400"/>
             <a:ext cx="914400" cy="914400"/>
+          </a:xfrm>
+          <a:prstGeom prst="rect">
+            <a:avLst/>
+          </a:prstGeom>
+        </p:spPr>
+      </p:pic>
+      <p:pic>
+        <p:nvPicPr>
+          <p:cNvPr id="7" name="Graphic 6" descr="Ecommerce with solid fill">
+            <a:extLst>
+              <a:ext uri="{FF2B5EF4-FFF2-40B4-BE49-F238E27FC236}">
+                <a16:creationId xmlns:a16="http://schemas.microsoft.com/office/drawing/2014/main" id="{66AD505E-9054-E292-9576-D34CD8C122A2}"/>
+              </a:ext>
+            </a:extLst>
+          </p:cNvPr>
+          <p:cNvPicPr>
+            <a:picLocks noChangeAspect="1"/>
+          </p:cNvPicPr>
+          <p:nvPr/>
+        </p:nvPicPr>
+        <p:blipFill>
+          <a:blip r:embed="rId11">
+            <a:extLst>
+              <a:ext uri="{28A0092B-C50C-407E-A947-70E740481C1C}">
+                <a14:useLocalDpi xmlns:a14="http://schemas.microsoft.com/office/drawing/2010/main" val="0"/>
+              </a:ext>
+              <a:ext uri="{96DAC541-7B7A-43D3-8B79-37D633B846F1}">
+                <asvg:svgBlip xmlns:asvg="http://schemas.microsoft.com/office/drawing/2016/SVG/main" r:embed="rId12"/>
+              </a:ext>
+            </a:extLst>
+          </a:blip>
+          <a:stretch>
+            <a:fillRect/>
+          </a:stretch>
+        </p:blipFill>
+        <p:spPr>
+          <a:xfrm>
+            <a:off x="1116368" y="4835206"/>
+            <a:ext cx="723653" cy="723653"/>
+          </a:xfrm>
+          <a:prstGeom prst="rect">
+            <a:avLst/>
+          </a:prstGeom>
+        </p:spPr>
+      </p:pic>
+      <p:pic>
+        <p:nvPicPr>
+          <p:cNvPr id="12" name="Graphic 11" descr="Smart Phone with solid fill">
+            <a:extLst>
+              <a:ext uri="{FF2B5EF4-FFF2-40B4-BE49-F238E27FC236}">
+                <a16:creationId xmlns:a16="http://schemas.microsoft.com/office/drawing/2014/main" id="{BACCE730-64A6-E321-6954-0FF07915ECBB}"/>
+              </a:ext>
+            </a:extLst>
+          </p:cNvPr>
+          <p:cNvPicPr>
+            <a:picLocks noChangeAspect="1"/>
+          </p:cNvPicPr>
+          <p:nvPr/>
+        </p:nvPicPr>
+        <p:blipFill>
+          <a:blip r:embed="rId13">
+            <a:extLst>
+              <a:ext uri="{28A0092B-C50C-407E-A947-70E740481C1C}">
+                <a14:useLocalDpi xmlns:a14="http://schemas.microsoft.com/office/drawing/2010/main" val="0"/>
+              </a:ext>
+              <a:ext uri="{96DAC541-7B7A-43D3-8B79-37D633B846F1}">
+                <asvg:svgBlip xmlns:asvg="http://schemas.microsoft.com/office/drawing/2016/SVG/main" r:embed="rId14"/>
+              </a:ext>
+            </a:extLst>
+          </a:blip>
+          <a:stretch>
+            <a:fillRect/>
+          </a:stretch>
+        </p:blipFill>
+        <p:spPr>
+          <a:xfrm>
+            <a:off x="1116368" y="5889726"/>
+            <a:ext cx="723653" cy="723653"/>
           </a:xfrm>
           <a:prstGeom prst="rect">
             <a:avLst/>

</xml_diff>